<commit_message>
updating les03, and upgrading @NotBlank
</commit_message>
<xml_diff>
--- a/doc/intro/slides/lesson_03_jpa.pptx
+++ b/doc/intro/slides/lesson_03_jpa.pptx
@@ -206,7 +206,7 @@
           <a:p>
             <a:fld id="{9B5B52BA-3295-0343-9E28-A260A811DD10}" type="datetimeFigureOut">
               <a:rPr lang="en-US" smtClean="0"/>
-              <a:t>12/26/17</a:t>
+              <a:t>27-Nov-18</a:t>
             </a:fld>
             <a:endParaRPr lang="en-US"/>
           </a:p>
@@ -605,7 +605,7 @@
           <a:p>
             <a:fld id="{04F1D4A2-813C-F741-B481-C92B3A596030}" type="datetimeFigureOut">
               <a:rPr lang="en-US" smtClean="0"/>
-              <a:t>12/26/17</a:t>
+              <a:t>27-Nov-18</a:t>
             </a:fld>
             <a:endParaRPr lang="en-US"/>
           </a:p>
@@ -775,7 +775,7 @@
           <a:p>
             <a:fld id="{04F1D4A2-813C-F741-B481-C92B3A596030}" type="datetimeFigureOut">
               <a:rPr lang="en-US" smtClean="0"/>
-              <a:t>12/26/17</a:t>
+              <a:t>27-Nov-18</a:t>
             </a:fld>
             <a:endParaRPr lang="en-US"/>
           </a:p>
@@ -955,7 +955,7 @@
           <a:p>
             <a:fld id="{04F1D4A2-813C-F741-B481-C92B3A596030}" type="datetimeFigureOut">
               <a:rPr lang="en-US" smtClean="0"/>
-              <a:t>12/26/17</a:t>
+              <a:t>27-Nov-18</a:t>
             </a:fld>
             <a:endParaRPr lang="en-US"/>
           </a:p>
@@ -1136,7 +1136,7 @@
           <a:p>
             <a:fld id="{04F1D4A2-813C-F741-B481-C92B3A596030}" type="datetimeFigureOut">
               <a:rPr lang="en-US" smtClean="0"/>
-              <a:t>12/26/17</a:t>
+              <a:t>27-Nov-18</a:t>
             </a:fld>
             <a:endParaRPr lang="en-US"/>
           </a:p>
@@ -1382,7 +1382,7 @@
           <a:p>
             <a:fld id="{04F1D4A2-813C-F741-B481-C92B3A596030}" type="datetimeFigureOut">
               <a:rPr lang="en-US" smtClean="0"/>
-              <a:t>12/26/17</a:t>
+              <a:t>27-Nov-18</a:t>
             </a:fld>
             <a:endParaRPr lang="en-US"/>
           </a:p>
@@ -1614,7 +1614,7 @@
           <a:p>
             <a:fld id="{04F1D4A2-813C-F741-B481-C92B3A596030}" type="datetimeFigureOut">
               <a:rPr lang="en-US" smtClean="0"/>
-              <a:t>12/26/17</a:t>
+              <a:t>27-Nov-18</a:t>
             </a:fld>
             <a:endParaRPr lang="en-US"/>
           </a:p>
@@ -1981,7 +1981,7 @@
           <a:p>
             <a:fld id="{04F1D4A2-813C-F741-B481-C92B3A596030}" type="datetimeFigureOut">
               <a:rPr lang="en-US" smtClean="0"/>
-              <a:t>12/26/17</a:t>
+              <a:t>27-Nov-18</a:t>
             </a:fld>
             <a:endParaRPr lang="en-US"/>
           </a:p>
@@ -2099,7 +2099,7 @@
           <a:p>
             <a:fld id="{04F1D4A2-813C-F741-B481-C92B3A596030}" type="datetimeFigureOut">
               <a:rPr lang="en-US" smtClean="0"/>
-              <a:t>12/26/17</a:t>
+              <a:t>27-Nov-18</a:t>
             </a:fld>
             <a:endParaRPr lang="en-US"/>
           </a:p>
@@ -2194,7 +2194,7 @@
           <a:p>
             <a:fld id="{04F1D4A2-813C-F741-B481-C92B3A596030}" type="datetimeFigureOut">
               <a:rPr lang="en-US" smtClean="0"/>
-              <a:t>12/26/17</a:t>
+              <a:t>27-Nov-18</a:t>
             </a:fld>
             <a:endParaRPr lang="en-US"/>
           </a:p>
@@ -2471,7 +2471,7 @@
           <a:p>
             <a:fld id="{04F1D4A2-813C-F741-B481-C92B3A596030}" type="datetimeFigureOut">
               <a:rPr lang="en-US" smtClean="0"/>
-              <a:t>12/26/17</a:t>
+              <a:t>27-Nov-18</a:t>
             </a:fld>
             <a:endParaRPr lang="en-US"/>
           </a:p>
@@ -2724,7 +2724,7 @@
           <a:p>
             <a:fld id="{04F1D4A2-813C-F741-B481-C92B3A596030}" type="datetimeFigureOut">
               <a:rPr lang="en-US" smtClean="0"/>
-              <a:t>12/26/17</a:t>
+              <a:t>27-Nov-18</a:t>
             </a:fld>
             <a:endParaRPr lang="en-US"/>
           </a:p>
@@ -2937,7 +2937,7 @@
           <a:p>
             <a:fld id="{04F1D4A2-813C-F741-B481-C92B3A596030}" type="datetimeFigureOut">
               <a:rPr lang="en-US" smtClean="0"/>
-              <a:t>12/26/17</a:t>
+              <a:t>27-Nov-18</a:t>
             </a:fld>
             <a:endParaRPr lang="en-US"/>
           </a:p>
@@ -3352,9 +3352,16 @@
             <p:ph type="ctrTitle"/>
           </p:nvPr>
         </p:nvSpPr>
-        <p:spPr/>
-        <p:txBody>
-          <a:bodyPr/>
+        <p:spPr>
+          <a:xfrm>
+            <a:off x="396240" y="1122363"/>
+            <a:ext cx="11490960" cy="3610504"/>
+          </a:xfrm>
+        </p:spPr>
+        <p:txBody>
+          <a:bodyPr>
+            <a:normAutofit/>
+          </a:bodyPr>
           <a:lstStyle/>
           <a:p>
             <a:pPr algn="l"/>
@@ -3368,22 +3375,25 @@
             </a:r>
             <a:r>
               <a:rPr lang="en-US" dirty="0" smtClean="0"/>
-              <a:t> 1</a:t>
+              <a:t> </a:t>
+            </a:r>
+            <a:r>
+              <a:rPr lang="en-US" dirty="0" smtClean="0"/>
+              <a:t>1</a:t>
             </a:r>
             <a:br>
               <a:rPr lang="en-US" dirty="0" smtClean="0"/>
             </a:br>
             <a:r>
               <a:rPr lang="en-US" dirty="0" smtClean="0"/>
-              <a:t>Lesson </a:t>
-            </a:r>
-            <a:r>
-              <a:rPr lang="en-US" dirty="0" smtClean="0"/>
-              <a:t>03: </a:t>
-            </a:r>
-            <a:r>
-              <a:rPr lang="en-US" dirty="0" smtClean="0"/>
-              <a:t>JPA</a:t>
+              <a:t/>
+            </a:r>
+            <a:br>
+              <a:rPr lang="en-US" dirty="0" smtClean="0"/>
+            </a:br>
+            <a:r>
+              <a:rPr lang="en-US" dirty="0" smtClean="0"/>
+              <a:t>Lesson 03: JPA</a:t>
             </a:r>
             <a:endParaRPr lang="en-US" dirty="0"/>
           </a:p>
@@ -3401,36 +3411,26 @@
         </p:nvSpPr>
         <p:spPr>
           <a:xfrm>
-            <a:off x="1524000" y="3920358"/>
-            <a:ext cx="9144000" cy="1337441"/>
+            <a:off x="1524000" y="5952067"/>
+            <a:ext cx="9144000" cy="677331"/>
           </a:xfrm>
         </p:spPr>
         <p:txBody>
           <a:bodyPr>
-            <a:normAutofit fontScale="92500" lnSpcReduction="10000"/>
+            <a:normAutofit/>
           </a:bodyPr>
           <a:lstStyle/>
           <a:p>
             <a:pPr algn="r"/>
             <a:r>
               <a:rPr lang="en-US" dirty="0" smtClean="0"/>
-              <a:t>Dr. Andrea Arcuri</a:t>
-            </a:r>
-          </a:p>
-          <a:p>
-            <a:pPr algn="r"/>
-            <a:r>
-              <a:rPr lang="en-US" dirty="0" smtClean="0"/>
-              <a:t>Westerdals Oslo ACT</a:t>
-            </a:r>
-          </a:p>
-          <a:p>
-            <a:pPr algn="r"/>
-            <a:r>
-              <a:rPr lang="en-US" dirty="0" smtClean="0"/>
-              <a:t>University of Luxembourg</a:t>
-            </a:r>
-            <a:endParaRPr lang="en-US" dirty="0"/>
+              <a:t>Dr. Andrea </a:t>
+            </a:r>
+            <a:r>
+              <a:rPr lang="en-US" dirty="0" smtClean="0"/>
+              <a:t>Arcuri</a:t>
+            </a:r>
+            <a:endParaRPr lang="en-US" dirty="0" smtClean="0"/>
           </a:p>
         </p:txBody>
       </p:sp>
@@ -3539,7 +3539,6 @@
               <a:rPr lang="en-US" b="1" dirty="0" smtClean="0"/>
               <a:t>/lock</a:t>
             </a:r>
-            <a:endParaRPr lang="en-US" b="1" dirty="0" smtClean="0"/>
           </a:p>
           <a:p>
             <a:r>
@@ -3594,19 +3593,7 @@
           <a:p>
             <a:r>
               <a:rPr lang="en-US" dirty="0" smtClean="0"/>
-              <a:t>Exercises </a:t>
-            </a:r>
-            <a:r>
-              <a:rPr lang="en-US" dirty="0" smtClean="0"/>
-              <a:t>for Lesson </a:t>
-            </a:r>
-            <a:r>
-              <a:rPr lang="en-US" dirty="0" smtClean="0"/>
-              <a:t>03 </a:t>
-            </a:r>
-            <a:r>
-              <a:rPr lang="en-US" dirty="0" smtClean="0"/>
-              <a:t>(see documentation)</a:t>
+              <a:t>Exercises for Lesson 03 (see documentation)</a:t>
             </a:r>
             <a:endParaRPr lang="en-US" dirty="0"/>
           </a:p>
@@ -3903,10 +3890,15 @@
             <p:ph idx="1"/>
           </p:nvPr>
         </p:nvSpPr>
-        <p:spPr/>
+        <p:spPr>
+          <a:xfrm>
+            <a:off x="414867" y="1825625"/>
+            <a:ext cx="11421533" cy="4351338"/>
+          </a:xfrm>
+        </p:spPr>
         <p:txBody>
           <a:bodyPr>
-            <a:normAutofit fontScale="92500" lnSpcReduction="10000"/>
+            <a:normAutofit fontScale="92500"/>
           </a:bodyPr>
           <a:lstStyle/>
           <a:p>
@@ -4020,7 +4012,12 @@
             <p:ph idx="1"/>
           </p:nvPr>
         </p:nvSpPr>
-        <p:spPr/>
+        <p:spPr>
+          <a:xfrm>
+            <a:off x="313267" y="1825625"/>
+            <a:ext cx="11455400" cy="4351338"/>
+          </a:xfrm>
+        </p:spPr>
         <p:txBody>
           <a:bodyPr/>
           <a:lstStyle/>
@@ -4138,7 +4135,15 @@
           <a:p>
             <a:r>
               <a:rPr lang="en-US" dirty="0" smtClean="0"/>
-              <a:t>Can have special validation tags on the @Entity fields</a:t>
+              <a:t>Can have special validation tags on the </a:t>
+            </a:r>
+            <a:r>
+              <a:rPr lang="en-US" i="1" dirty="0" smtClean="0"/>
+              <a:t>@Entity </a:t>
+            </a:r>
+            <a:r>
+              <a:rPr lang="en-US" dirty="0" smtClean="0"/>
+              <a:t>fields</a:t>
             </a:r>
           </a:p>
           <a:p>
@@ -4467,10 +4472,15 @@
             <p:ph idx="1"/>
           </p:nvPr>
         </p:nvSpPr>
-        <p:spPr/>
+        <p:spPr>
+          <a:xfrm>
+            <a:off x="491067" y="1825624"/>
+            <a:ext cx="11396133" cy="4829175"/>
+          </a:xfrm>
+        </p:spPr>
         <p:txBody>
           <a:bodyPr>
-            <a:normAutofit lnSpcReduction="10000"/>
+            <a:normAutofit/>
           </a:bodyPr>
           <a:lstStyle/>
           <a:p>
@@ -4495,7 +4505,7 @@
               <a:t>One role of ORMs is to translate your </a:t>
             </a:r>
             <a:r>
-              <a:rPr lang="en-US" dirty="0" err="1" smtClean="0"/>
+              <a:rPr lang="en-US" i="1" dirty="0" err="1" smtClean="0"/>
               <a:t>EntityManager</a:t>
             </a:r>
             <a:r>

</xml_diff>